<commit_message>
images on last pages
</commit_message>
<xml_diff>
--- a/06. Universal Windows Platform/Entwicklung einer App für die universelle Windows Plattform.pptx
+++ b/06. Universal Windows Platform/Entwicklung einer App für die universelle Windows Plattform.pptx
@@ -322,7 +322,7 @@
               <a:pPr>
                 <a:defRPr/>
               </a:pPr>
-              <a:t>24.09.2017</a:t>
+              <a:t>26.09.2017</a:t>
             </a:fld>
             <a:endParaRPr lang="de-DE"/>
           </a:p>
@@ -521,7 +521,7 @@
               <a:pPr>
                 <a:defRPr/>
               </a:pPr>
-              <a:t>2017-09-24</a:t>
+              <a:t>2017-09-26</a:t>
             </a:fld>
             <a:endParaRPr lang="sv-SE"/>
           </a:p>
@@ -8711,15 +8711,7 @@
             </a:pPr>
             <a:r>
               <a:rPr lang="de-DE" dirty="0" smtClean="0"/>
-              <a:t>Werte </a:t>
-            </a:r>
-            <a:r>
-              <a:rPr lang="de-DE" dirty="0" smtClean="0"/>
-              <a:t>und Typen während </a:t>
-            </a:r>
-            <a:r>
-              <a:rPr lang="de-DE" dirty="0" smtClean="0"/>
-              <a:t>der Datenbindung verändern</a:t>
+              <a:t>Werte und Typen während der Datenbindung verändern</a:t>
             </a:r>
           </a:p>
           <a:p>
@@ -8785,11 +8777,7 @@
             </a:pPr>
             <a:r>
               <a:rPr lang="de-DE" dirty="0" smtClean="0"/>
-              <a:t>Collection </a:t>
-            </a:r>
-            <a:r>
-              <a:rPr lang="de-DE" dirty="0" smtClean="0"/>
-              <a:t>(</a:t>
+              <a:t>Collection (</a:t>
             </a:r>
             <a:r>
               <a:rPr lang="de-DE" dirty="0" err="1" smtClean="0"/>
@@ -10074,6 +10062,113 @@
           </a:p>
           <a:p>
             <a:r>
+              <a:rPr lang="en-US" dirty="0" smtClean="0">
+                <a:solidFill>
+                  <a:srgbClr val="0000FF"/>
+                </a:solidFill>
+                <a:latin typeface="Consolas" panose="020B0609020204030204" pitchFamily="49" charset="0"/>
+              </a:rPr>
+              <a:t>	public</a:t>
+            </a:r>
+            <a:r>
+              <a:rPr lang="en-US" dirty="0" smtClean="0">
+                <a:solidFill>
+                  <a:srgbClr val="000000"/>
+                </a:solidFill>
+                <a:latin typeface="Consolas" panose="020B0609020204030204" pitchFamily="49" charset="0"/>
+              </a:rPr>
+              <a:t> </a:t>
+            </a:r>
+            <a:r>
+              <a:rPr lang="en-US" dirty="0" err="1">
+                <a:solidFill>
+                  <a:srgbClr val="2B91AF"/>
+                </a:solidFill>
+                <a:latin typeface="Consolas" panose="020B0609020204030204" pitchFamily="49" charset="0"/>
+              </a:rPr>
+              <a:t>DelegateCommand</a:t>
+            </a:r>
+            <a:r>
+              <a:rPr lang="en-US" dirty="0">
+                <a:solidFill>
+                  <a:srgbClr val="000000"/>
+                </a:solidFill>
+                <a:latin typeface="Consolas" panose="020B0609020204030204" pitchFamily="49" charset="0"/>
+              </a:rPr>
+              <a:t> </a:t>
+            </a:r>
+            <a:r>
+              <a:rPr lang="en-US" dirty="0" err="1">
+                <a:solidFill>
+                  <a:srgbClr val="000000"/>
+                </a:solidFill>
+                <a:latin typeface="Consolas" panose="020B0609020204030204" pitchFamily="49" charset="0"/>
+              </a:rPr>
+              <a:t>PickFileCommand</a:t>
+            </a:r>
+            <a:r>
+              <a:rPr lang="en-US" dirty="0">
+                <a:solidFill>
+                  <a:srgbClr val="000000"/>
+                </a:solidFill>
+                <a:latin typeface="Consolas" panose="020B0609020204030204" pitchFamily="49" charset="0"/>
+              </a:rPr>
+              <a:t> { </a:t>
+            </a:r>
+            <a:r>
+              <a:rPr lang="en-US" dirty="0">
+                <a:solidFill>
+                  <a:srgbClr val="0000FF"/>
+                </a:solidFill>
+                <a:latin typeface="Consolas" panose="020B0609020204030204" pitchFamily="49" charset="0"/>
+              </a:rPr>
+              <a:t>get</a:t>
+            </a:r>
+            <a:r>
+              <a:rPr lang="en-US" dirty="0">
+                <a:solidFill>
+                  <a:srgbClr val="000000"/>
+                </a:solidFill>
+                <a:latin typeface="Consolas" panose="020B0609020204030204" pitchFamily="49" charset="0"/>
+              </a:rPr>
+              <a:t>; </a:t>
+            </a:r>
+            <a:r>
+              <a:rPr lang="en-US" dirty="0">
+                <a:solidFill>
+                  <a:srgbClr val="0000FF"/>
+                </a:solidFill>
+                <a:latin typeface="Consolas" panose="020B0609020204030204" pitchFamily="49" charset="0"/>
+              </a:rPr>
+              <a:t>set</a:t>
+            </a:r>
+            <a:r>
+              <a:rPr lang="en-US" dirty="0">
+                <a:solidFill>
+                  <a:srgbClr val="000000"/>
+                </a:solidFill>
+                <a:latin typeface="Consolas" panose="020B0609020204030204" pitchFamily="49" charset="0"/>
+              </a:rPr>
+              <a:t>; </a:t>
+            </a:r>
+            <a:r>
+              <a:rPr lang="en-US" dirty="0" smtClean="0">
+                <a:solidFill>
+                  <a:srgbClr val="000000"/>
+                </a:solidFill>
+                <a:latin typeface="Consolas" panose="020B0609020204030204" pitchFamily="49" charset="0"/>
+              </a:rPr>
+              <a:t>}</a:t>
+            </a:r>
+            <a:endParaRPr lang="de-DE" dirty="0" smtClean="0">
+              <a:solidFill>
+                <a:srgbClr val="2B91AF"/>
+              </a:solidFill>
+              <a:latin typeface="Consolas" panose="020B0609020204030204" pitchFamily="49" charset="0"/>
+            </a:endParaRPr>
+          </a:p>
+          <a:p>
+            <a:r>
               <a:rPr lang="de-DE" dirty="0" smtClean="0">
                 <a:solidFill>
                   <a:srgbClr val="000000"/>
@@ -10254,121 +10349,14 @@
           </a:p>
           <a:p>
             <a:r>
-              <a:rPr lang="en-US" dirty="0" smtClean="0">
-                <a:solidFill>
-                  <a:srgbClr val="0000FF"/>
-                </a:solidFill>
-                <a:latin typeface="Consolas" panose="020B0609020204030204" pitchFamily="49" charset="0"/>
-              </a:rPr>
-              <a:t>	public</a:t>
-            </a:r>
-            <a:r>
-              <a:rPr lang="en-US" dirty="0" smtClean="0">
-                <a:solidFill>
-                  <a:srgbClr val="000000"/>
-                </a:solidFill>
-                <a:latin typeface="Consolas" panose="020B0609020204030204" pitchFamily="49" charset="0"/>
-              </a:rPr>
-              <a:t> </a:t>
-            </a:r>
-            <a:r>
-              <a:rPr lang="en-US" dirty="0" err="1" smtClean="0">
-                <a:solidFill>
-                  <a:srgbClr val="2B91AF"/>
-                </a:solidFill>
-                <a:latin typeface="Consolas" panose="020B0609020204030204" pitchFamily="49" charset="0"/>
-              </a:rPr>
-              <a:t>DelegateCommand</a:t>
-            </a:r>
-            <a:r>
-              <a:rPr lang="en-US" dirty="0" smtClean="0">
-                <a:solidFill>
-                  <a:srgbClr val="000000"/>
-                </a:solidFill>
-                <a:latin typeface="Consolas" panose="020B0609020204030204" pitchFamily="49" charset="0"/>
-              </a:rPr>
-              <a:t> </a:t>
-            </a:r>
-            <a:r>
-              <a:rPr lang="en-US" dirty="0" err="1">
-                <a:solidFill>
-                  <a:srgbClr val="000000"/>
-                </a:solidFill>
-                <a:latin typeface="Consolas" panose="020B0609020204030204" pitchFamily="49" charset="0"/>
-              </a:rPr>
-              <a:t>PickFileCommand</a:t>
-            </a:r>
-            <a:r>
-              <a:rPr lang="en-US" dirty="0">
-                <a:solidFill>
-                  <a:srgbClr val="000000"/>
-                </a:solidFill>
-                <a:latin typeface="Consolas" panose="020B0609020204030204" pitchFamily="49" charset="0"/>
-              </a:rPr>
-              <a:t> { </a:t>
-            </a:r>
-            <a:r>
-              <a:rPr lang="en-US" dirty="0">
-                <a:solidFill>
-                  <a:srgbClr val="0000FF"/>
-                </a:solidFill>
-                <a:latin typeface="Consolas" panose="020B0609020204030204" pitchFamily="49" charset="0"/>
-              </a:rPr>
-              <a:t>get</a:t>
-            </a:r>
-            <a:r>
-              <a:rPr lang="en-US" dirty="0">
-                <a:solidFill>
-                  <a:srgbClr val="000000"/>
-                </a:solidFill>
-                <a:latin typeface="Consolas" panose="020B0609020204030204" pitchFamily="49" charset="0"/>
-              </a:rPr>
-              <a:t>; </a:t>
-            </a:r>
-            <a:r>
-              <a:rPr lang="en-US" dirty="0">
-                <a:solidFill>
-                  <a:srgbClr val="0000FF"/>
-                </a:solidFill>
-                <a:latin typeface="Consolas" panose="020B0609020204030204" pitchFamily="49" charset="0"/>
-              </a:rPr>
-              <a:t>set</a:t>
-            </a:r>
-            <a:r>
-              <a:rPr lang="en-US" dirty="0">
-                <a:solidFill>
-                  <a:srgbClr val="000000"/>
-                </a:solidFill>
-                <a:latin typeface="Consolas" panose="020B0609020204030204" pitchFamily="49" charset="0"/>
-              </a:rPr>
-              <a:t>; </a:t>
-            </a:r>
-            <a:r>
-              <a:rPr lang="en-US" dirty="0" smtClean="0">
-                <a:solidFill>
-                  <a:srgbClr val="000000"/>
-                </a:solidFill>
+              <a:rPr lang="de-DE" dirty="0" smtClean="0">
                 <a:latin typeface="Consolas" panose="020B0609020204030204" pitchFamily="49" charset="0"/>
               </a:rPr>
               <a:t>}</a:t>
             </a:r>
             <a:endParaRPr lang="de-DE" dirty="0" smtClean="0">
-              <a:solidFill>
-                <a:srgbClr val="2B91AF"/>
-              </a:solidFill>
               <a:latin typeface="Consolas" panose="020B0609020204030204" pitchFamily="49" charset="0"/>
             </a:endParaRPr>
-          </a:p>
-          <a:p>
-            <a:r>
-              <a:rPr lang="de-DE" dirty="0" smtClean="0">
-                <a:solidFill>
-                  <a:srgbClr val="2B91AF"/>
-                </a:solidFill>
-                <a:latin typeface="Consolas" panose="020B0609020204030204" pitchFamily="49" charset="0"/>
-              </a:rPr>
-              <a:t>}</a:t>
-            </a:r>
           </a:p>
           <a:p>
             <a:endParaRPr lang="de-DE" dirty="0" smtClean="0">
@@ -11285,7 +11273,11 @@
             </a:pPr>
             <a:r>
               <a:rPr lang="de-DE" dirty="0" smtClean="0"/>
-              <a:t>Posts abrufen</a:t>
+              <a:t>Posts </a:t>
+            </a:r>
+            <a:r>
+              <a:rPr lang="de-DE" dirty="0" smtClean="0"/>
+              <a:t>abrufen</a:t>
             </a:r>
           </a:p>
           <a:p>
@@ -11296,18 +11288,11 @@
             </a:pPr>
             <a:r>
               <a:rPr lang="de-DE" dirty="0" smtClean="0"/>
-              <a:t>Registrierung und Login</a:t>
-            </a:r>
-          </a:p>
-          <a:p>
-            <a:pPr>
-              <a:lnSpc>
-                <a:spcPct val="150000"/>
-              </a:lnSpc>
-            </a:pPr>
+              <a:t>Hands-On </a:t>
+            </a:r>
             <a:r>
               <a:rPr lang="de-DE" dirty="0" smtClean="0"/>
-              <a:t>Hands-On (später):</a:t>
+              <a:t>(später):</a:t>
             </a:r>
           </a:p>
           <a:p>
@@ -11329,26 +11314,11 @@
             </a:pPr>
             <a:r>
               <a:rPr lang="de-DE" dirty="0" smtClean="0"/>
-              <a:t>Die API anbinden um Posts abzurufen</a:t>
-            </a:r>
-          </a:p>
-          <a:p>
-            <a:pPr lvl="1">
-              <a:lnSpc>
-                <a:spcPct val="150000"/>
-              </a:lnSpc>
-            </a:pPr>
+              <a:t>Die API anbinden um Posts </a:t>
+            </a:r>
             <a:r>
               <a:rPr lang="de-DE" dirty="0" smtClean="0"/>
-              <a:t>Registrierung </a:t>
-            </a:r>
-            <a:r>
-              <a:rPr lang="de-DE" dirty="0"/>
-              <a:t>und Login der API </a:t>
-            </a:r>
-            <a:r>
-              <a:rPr lang="de-DE" dirty="0" smtClean="0"/>
-              <a:t>verwenden</a:t>
+              <a:t>abzurufen</a:t>
             </a:r>
           </a:p>
           <a:p>
@@ -11977,6 +11947,43 @@
           <a:chExt cx="0" cy="0"/>
         </a:xfrm>
       </p:grpSpPr>
+      <p:pic>
+        <p:nvPicPr>
+          <p:cNvPr id="8" name="Grafik 7"/>
+          <p:cNvPicPr>
+            <a:picLocks noChangeAspect="1"/>
+          </p:cNvPicPr>
+          <p:nvPr/>
+        </p:nvPicPr>
+        <p:blipFill>
+          <a:blip r:embed="rId3">
+            <a:extLst>
+              <a:ext uri="{28A0092B-C50C-407E-A947-70E740481C1C}">
+                <a14:useLocalDpi xmlns:a14="http://schemas.microsoft.com/office/drawing/2010/main" val="0"/>
+              </a:ext>
+            </a:extLst>
+          </a:blip>
+          <a:stretch>
+            <a:fillRect/>
+          </a:stretch>
+        </p:blipFill>
+        <p:spPr>
+          <a:xfrm>
+            <a:off x="6777023" y="3897422"/>
+            <a:ext cx="2043654" cy="2043654"/>
+          </a:xfrm>
+          <a:prstGeom prst="rect">
+            <a:avLst/>
+          </a:prstGeom>
+          <a:effectLst>
+            <a:outerShdw blurRad="50800" dist="38100" dir="2700000" algn="tl" rotWithShape="0">
+              <a:prstClr val="black">
+                <a:alpha val="40000"/>
+              </a:prstClr>
+            </a:outerShdw>
+          </a:effectLst>
+        </p:spPr>
+      </p:pic>
       <p:sp>
         <p:nvSpPr>
           <p:cNvPr id="2" name="Titel 1"/>
@@ -12029,6 +12036,180 @@
           </a:p>
         </p:txBody>
       </p:sp>
+      <p:sp>
+        <p:nvSpPr>
+          <p:cNvPr id="9" name="Textfeld 8"/>
+          <p:cNvSpPr txBox="1"/>
+          <p:nvPr/>
+        </p:nvSpPr>
+        <p:spPr>
+          <a:xfrm>
+            <a:off x="587298" y="1779928"/>
+            <a:ext cx="4437616" cy="3139321"/>
+          </a:xfrm>
+          <a:prstGeom prst="rect">
+            <a:avLst/>
+          </a:prstGeom>
+          <a:noFill/>
+        </p:spPr>
+        <p:txBody>
+          <a:bodyPr wrap="square" rtlCol="0">
+            <a:spAutoFit/>
+          </a:bodyPr>
+          <a:lstStyle/>
+          <a:p>
+            <a:r>
+              <a:rPr lang="de-DE" dirty="0" smtClean="0">
+                <a:solidFill>
+                  <a:schemeClr val="accent3"/>
+                </a:solidFill>
+              </a:rPr>
+              <a:t>Kontakt:</a:t>
+            </a:r>
+          </a:p>
+          <a:p>
+            <a:endParaRPr lang="de-DE" dirty="0" smtClean="0">
+              <a:solidFill>
+                <a:schemeClr val="accent3"/>
+              </a:solidFill>
+            </a:endParaRPr>
+          </a:p>
+          <a:p>
+            <a:r>
+              <a:rPr lang="de-DE" dirty="0" smtClean="0">
+                <a:solidFill>
+                  <a:schemeClr val="accent3"/>
+                </a:solidFill>
+              </a:rPr>
+              <a:t>Constantin Petsch</a:t>
+            </a:r>
+          </a:p>
+          <a:p>
+            <a:r>
+              <a:rPr lang="de-DE" dirty="0" smtClean="0">
+                <a:hlinkClick r:id="rId4"/>
+              </a:rPr>
+              <a:t>constantin.petsch@acando.de</a:t>
+            </a:r>
+            <a:endParaRPr lang="de-DE" dirty="0" smtClean="0"/>
+          </a:p>
+          <a:p>
+            <a:endParaRPr lang="de-DE" dirty="0" smtClean="0">
+              <a:solidFill>
+                <a:schemeClr val="accent3"/>
+              </a:solidFill>
+            </a:endParaRPr>
+          </a:p>
+          <a:p>
+            <a:r>
+              <a:rPr lang="de-DE" dirty="0">
+                <a:solidFill>
+                  <a:schemeClr val="accent3"/>
+                </a:solidFill>
+              </a:rPr>
+              <a:t>Sadeq Abu </a:t>
+            </a:r>
+            <a:r>
+              <a:rPr lang="de-DE" dirty="0" smtClean="0">
+                <a:solidFill>
+                  <a:schemeClr val="accent3"/>
+                </a:solidFill>
+              </a:rPr>
+              <a:t>Hantash</a:t>
+            </a:r>
+            <a:br>
+              <a:rPr lang="de-DE" dirty="0" smtClean="0">
+                <a:solidFill>
+                  <a:schemeClr val="accent3"/>
+                </a:solidFill>
+              </a:rPr>
+            </a:br>
+            <a:r>
+              <a:rPr lang="de-DE" dirty="0" smtClean="0">
+                <a:hlinkClick r:id="rId5"/>
+              </a:rPr>
+              <a:t>sadeq.abu.hantash@acando.de</a:t>
+            </a:r>
+            <a:endParaRPr lang="de-DE" dirty="0" smtClean="0"/>
+          </a:p>
+          <a:p>
+            <a:endParaRPr lang="de-DE" dirty="0">
+              <a:solidFill>
+                <a:schemeClr val="accent3"/>
+              </a:solidFill>
+            </a:endParaRPr>
+          </a:p>
+          <a:p>
+            <a:r>
+              <a:rPr lang="de-DE" dirty="0" smtClean="0">
+                <a:solidFill>
+                  <a:schemeClr val="accent3"/>
+                </a:solidFill>
+              </a:rPr>
+              <a:t>Florian Sibinger</a:t>
+            </a:r>
+          </a:p>
+          <a:p>
+            <a:r>
+              <a:rPr lang="de-DE" dirty="0" smtClean="0">
+                <a:solidFill>
+                  <a:schemeClr val="accent3"/>
+                </a:solidFill>
+                <a:hlinkClick r:id="rId6"/>
+              </a:rPr>
+              <a:t>florian.sibinger@acando.de</a:t>
+            </a:r>
+            <a:endParaRPr lang="de-DE" dirty="0" smtClean="0">
+              <a:solidFill>
+                <a:schemeClr val="accent3"/>
+              </a:solidFill>
+            </a:endParaRPr>
+          </a:p>
+          <a:p>
+            <a:endParaRPr lang="de-DE" dirty="0">
+              <a:solidFill>
+                <a:schemeClr val="accent3"/>
+              </a:solidFill>
+            </a:endParaRPr>
+          </a:p>
+        </p:txBody>
+      </p:sp>
+      <p:pic>
+        <p:nvPicPr>
+          <p:cNvPr id="7" name="Inhaltsplatzhalter 1"/>
+          <p:cNvPicPr>
+            <a:picLocks noGrp="1"/>
+          </p:cNvPicPr>
+          <p:nvPr>
+            <p:ph idx="1"/>
+          </p:nvPr>
+        </p:nvPicPr>
+        <p:blipFill>
+          <a:blip r:embed="rId7" cstate="print">
+            <a:extLst>
+              <a:ext uri="{28A0092B-C50C-407E-A947-70E740481C1C}">
+                <a14:useLocalDpi xmlns:a14="http://schemas.microsoft.com/office/drawing/2010/main" val="0"/>
+              </a:ext>
+            </a:extLst>
+          </a:blip>
+          <a:stretch>
+            <a:fillRect/>
+          </a:stretch>
+        </p:blipFill>
+        <p:spPr>
+          <a:xfrm>
+            <a:off x="8479972" y="2347074"/>
+            <a:ext cx="2239596" cy="2005028"/>
+          </a:xfrm>
+          <a:effectLst>
+            <a:outerShdw blurRad="50800" dist="38100" dir="2700000" algn="tl" rotWithShape="0">
+              <a:prstClr val="black">
+                <a:alpha val="40000"/>
+              </a:prstClr>
+            </a:outerShdw>
+          </a:effectLst>
+        </p:spPr>
+      </p:pic>
       <p:pic>
         <p:nvPicPr>
           <p:cNvPr id="6" name="Picture 6"/>
@@ -12038,7 +12219,7 @@
           <p:nvPr/>
         </p:nvPicPr>
         <p:blipFill>
-          <a:blip r:embed="rId3">
+          <a:blip r:embed="rId8">
             <a:extLst>
               <a:ext uri="{28A0092B-C50C-407E-A947-70E740481C1C}">
                 <a14:useLocalDpi xmlns:a14="http://schemas.microsoft.com/office/drawing/2010/main" val="0"/>
@@ -12076,144 +12257,6 @@
           </a:extLst>
         </p:spPr>
       </p:pic>
-      <p:sp>
-        <p:nvSpPr>
-          <p:cNvPr id="9" name="Textfeld 8"/>
-          <p:cNvSpPr txBox="1"/>
-          <p:nvPr/>
-        </p:nvSpPr>
-        <p:spPr>
-          <a:xfrm>
-            <a:off x="587298" y="1779928"/>
-            <a:ext cx="4437616" cy="3139321"/>
-          </a:xfrm>
-          <a:prstGeom prst="rect">
-            <a:avLst/>
-          </a:prstGeom>
-          <a:noFill/>
-        </p:spPr>
-        <p:txBody>
-          <a:bodyPr wrap="square" rtlCol="0">
-            <a:spAutoFit/>
-          </a:bodyPr>
-          <a:lstStyle/>
-          <a:p>
-            <a:r>
-              <a:rPr lang="de-DE" dirty="0" smtClean="0">
-                <a:solidFill>
-                  <a:schemeClr val="accent3"/>
-                </a:solidFill>
-              </a:rPr>
-              <a:t>Kontakt:</a:t>
-            </a:r>
-          </a:p>
-          <a:p>
-            <a:endParaRPr lang="de-DE" dirty="0" smtClean="0">
-              <a:solidFill>
-                <a:schemeClr val="accent3"/>
-              </a:solidFill>
-            </a:endParaRPr>
-          </a:p>
-          <a:p>
-            <a:r>
-              <a:rPr lang="de-DE" dirty="0" smtClean="0">
-                <a:solidFill>
-                  <a:schemeClr val="accent3"/>
-                </a:solidFill>
-              </a:rPr>
-              <a:t>Constantin Petsch</a:t>
-            </a:r>
-          </a:p>
-          <a:p>
-            <a:r>
-              <a:rPr lang="de-DE" dirty="0" smtClean="0">
-                <a:hlinkClick r:id="rId4"/>
-              </a:rPr>
-              <a:t>constantin.petsch@acando.de</a:t>
-            </a:r>
-            <a:endParaRPr lang="de-DE" dirty="0" smtClean="0"/>
-          </a:p>
-          <a:p>
-            <a:endParaRPr lang="de-DE" dirty="0" smtClean="0">
-              <a:solidFill>
-                <a:schemeClr val="accent3"/>
-              </a:solidFill>
-            </a:endParaRPr>
-          </a:p>
-          <a:p>
-            <a:r>
-              <a:rPr lang="de-DE" dirty="0">
-                <a:solidFill>
-                  <a:schemeClr val="accent3"/>
-                </a:solidFill>
-              </a:rPr>
-              <a:t>Sadeq Abu </a:t>
-            </a:r>
-            <a:r>
-              <a:rPr lang="de-DE" dirty="0" smtClean="0">
-                <a:solidFill>
-                  <a:schemeClr val="accent3"/>
-                </a:solidFill>
-              </a:rPr>
-              <a:t>Hantash</a:t>
-            </a:r>
-            <a:br>
-              <a:rPr lang="de-DE" dirty="0" smtClean="0">
-                <a:solidFill>
-                  <a:schemeClr val="accent3"/>
-                </a:solidFill>
-              </a:rPr>
-            </a:br>
-            <a:r>
-              <a:rPr lang="de-DE" dirty="0" smtClean="0">
-                <a:hlinkClick r:id="rId5"/>
-              </a:rPr>
-              <a:t>sadeq.abu.hantash@acando.de</a:t>
-            </a:r>
-            <a:endParaRPr lang="de-DE" dirty="0" smtClean="0"/>
-          </a:p>
-          <a:p>
-            <a:endParaRPr lang="de-DE" dirty="0">
-              <a:solidFill>
-                <a:schemeClr val="accent3"/>
-              </a:solidFill>
-            </a:endParaRPr>
-          </a:p>
-          <a:p>
-            <a:r>
-              <a:rPr lang="de-DE" dirty="0" smtClean="0">
-                <a:solidFill>
-                  <a:schemeClr val="accent3"/>
-                </a:solidFill>
-              </a:rPr>
-              <a:t>Florian Sibinger</a:t>
-            </a:r>
-          </a:p>
-          <a:p>
-            <a:r>
-              <a:rPr lang="de-DE" dirty="0" smtClean="0">
-                <a:solidFill>
-                  <a:schemeClr val="accent3"/>
-                </a:solidFill>
-                <a:hlinkClick r:id="rId6"/>
-              </a:rPr>
-              <a:t>florian.sibinger@acando.de</a:t>
-            </a:r>
-            <a:endParaRPr lang="de-DE" dirty="0" smtClean="0">
-              <a:solidFill>
-                <a:schemeClr val="accent3"/>
-              </a:solidFill>
-            </a:endParaRPr>
-          </a:p>
-          <a:p>
-            <a:endParaRPr lang="de-DE" dirty="0">
-              <a:solidFill>
-                <a:schemeClr val="accent3"/>
-              </a:solidFill>
-            </a:endParaRPr>
-          </a:p>
-        </p:txBody>
-      </p:sp>
     </p:spTree>
     <p:extLst>
       <p:ext uri="{BB962C8B-B14F-4D97-AF65-F5344CB8AC3E}">

</xml_diff>